<commit_message>
add additional personas (foreign student, lecturer)
</commit_message>
<xml_diff>
--- a/persona/Personas2.pptx
+++ b/persona/Personas2.pptx
@@ -7,6 +7,8 @@
   <p:sldIdLst>
     <p:sldId id="257" r:id="rId2"/>
     <p:sldId id="259" r:id="rId3"/>
+    <p:sldId id="260" r:id="rId4"/>
+    <p:sldId id="261" r:id="rId5"/>
   </p:sldIdLst>
   <p:sldSz cx="12192000" cy="6858000"/>
   <p:notesSz cx="6858000" cy="9144000"/>
@@ -262,7 +264,7 @@
           <a:p>
             <a:fld id="{8B1F6BEF-6D8B-4DEB-9E20-05E468EF1E47}" type="datetimeFigureOut">
               <a:rPr lang="en-GB" smtClean="0"/>
-              <a:t>12/02/2019</a:t>
+              <a:t>13/02/2019</a:t>
             </a:fld>
             <a:endParaRPr lang="en-GB"/>
           </a:p>
@@ -462,7 +464,7 @@
           <a:p>
             <a:fld id="{8B1F6BEF-6D8B-4DEB-9E20-05E468EF1E47}" type="datetimeFigureOut">
               <a:rPr lang="en-GB" smtClean="0"/>
-              <a:t>12/02/2019</a:t>
+              <a:t>13/02/2019</a:t>
             </a:fld>
             <a:endParaRPr lang="en-GB"/>
           </a:p>
@@ -672,7 +674,7 @@
           <a:p>
             <a:fld id="{8B1F6BEF-6D8B-4DEB-9E20-05E468EF1E47}" type="datetimeFigureOut">
               <a:rPr lang="en-GB" smtClean="0"/>
-              <a:t>12/02/2019</a:t>
+              <a:t>13/02/2019</a:t>
             </a:fld>
             <a:endParaRPr lang="en-GB"/>
           </a:p>
@@ -872,7 +874,7 @@
           <a:p>
             <a:fld id="{8B1F6BEF-6D8B-4DEB-9E20-05E468EF1E47}" type="datetimeFigureOut">
               <a:rPr lang="en-GB" smtClean="0"/>
-              <a:t>12/02/2019</a:t>
+              <a:t>13/02/2019</a:t>
             </a:fld>
             <a:endParaRPr lang="en-GB"/>
           </a:p>
@@ -1148,7 +1150,7 @@
           <a:p>
             <a:fld id="{8B1F6BEF-6D8B-4DEB-9E20-05E468EF1E47}" type="datetimeFigureOut">
               <a:rPr lang="en-GB" smtClean="0"/>
-              <a:t>12/02/2019</a:t>
+              <a:t>13/02/2019</a:t>
             </a:fld>
             <a:endParaRPr lang="en-GB"/>
           </a:p>
@@ -1416,7 +1418,7 @@
           <a:p>
             <a:fld id="{8B1F6BEF-6D8B-4DEB-9E20-05E468EF1E47}" type="datetimeFigureOut">
               <a:rPr lang="en-GB" smtClean="0"/>
-              <a:t>12/02/2019</a:t>
+              <a:t>13/02/2019</a:t>
             </a:fld>
             <a:endParaRPr lang="en-GB"/>
           </a:p>
@@ -1831,7 +1833,7 @@
           <a:p>
             <a:fld id="{8B1F6BEF-6D8B-4DEB-9E20-05E468EF1E47}" type="datetimeFigureOut">
               <a:rPr lang="en-GB" smtClean="0"/>
-              <a:t>12/02/2019</a:t>
+              <a:t>13/02/2019</a:t>
             </a:fld>
             <a:endParaRPr lang="en-GB"/>
           </a:p>
@@ -1973,7 +1975,7 @@
           <a:p>
             <a:fld id="{8B1F6BEF-6D8B-4DEB-9E20-05E468EF1E47}" type="datetimeFigureOut">
               <a:rPr lang="en-GB" smtClean="0"/>
-              <a:t>12/02/2019</a:t>
+              <a:t>13/02/2019</a:t>
             </a:fld>
             <a:endParaRPr lang="en-GB"/>
           </a:p>
@@ -2086,7 +2088,7 @@
           <a:p>
             <a:fld id="{8B1F6BEF-6D8B-4DEB-9E20-05E468EF1E47}" type="datetimeFigureOut">
               <a:rPr lang="en-GB" smtClean="0"/>
-              <a:t>12/02/2019</a:t>
+              <a:t>13/02/2019</a:t>
             </a:fld>
             <a:endParaRPr lang="en-GB"/>
           </a:p>
@@ -2399,7 +2401,7 @@
           <a:p>
             <a:fld id="{8B1F6BEF-6D8B-4DEB-9E20-05E468EF1E47}" type="datetimeFigureOut">
               <a:rPr lang="en-GB" smtClean="0"/>
-              <a:t>12/02/2019</a:t>
+              <a:t>13/02/2019</a:t>
             </a:fld>
             <a:endParaRPr lang="en-GB"/>
           </a:p>
@@ -2688,7 +2690,7 @@
           <a:p>
             <a:fld id="{8B1F6BEF-6D8B-4DEB-9E20-05E468EF1E47}" type="datetimeFigureOut">
               <a:rPr lang="en-GB" smtClean="0"/>
-              <a:t>12/02/2019</a:t>
+              <a:t>13/02/2019</a:t>
             </a:fld>
             <a:endParaRPr lang="en-GB"/>
           </a:p>
@@ -2931,7 +2933,7 @@
           <a:p>
             <a:fld id="{8B1F6BEF-6D8B-4DEB-9E20-05E468EF1E47}" type="datetimeFigureOut">
               <a:rPr lang="en-GB" smtClean="0"/>
-              <a:t>12/02/2019</a:t>
+              <a:t>13/02/2019</a:t>
             </a:fld>
             <a:endParaRPr lang="en-GB"/>
           </a:p>
@@ -3401,7 +3403,7 @@
                 <a:ea typeface="+mn-ea"/>
                 <a:cs typeface="+mn-cs"/>
               </a:rPr>
-              <a:t>Billy Bob– Student</a:t>
+              <a:t>Billy Bob – Student</a:t>
             </a:r>
             <a:endParaRPr lang="en-GB" dirty="0"/>
           </a:p>
@@ -3617,14 +3619,14 @@
           <p:nvPr/>
         </p:nvPicPr>
         <p:blipFill rotWithShape="1">
-          <a:blip r:embed="rId2">
+          <a:blip r:embed="rId2" cstate="print">
             <a:extLst>
               <a:ext uri="{28A0092B-C50C-407E-A947-70E740481C1C}">
-                <a14:useLocalDpi xmlns:a14="http://schemas.microsoft.com/office/drawing/2010/main" val="0"/>
+                <a14:useLocalDpi xmlns:a14="http://schemas.microsoft.com/office/drawing/2010/main"/>
               </a:ext>
             </a:extLst>
           </a:blip>
-          <a:srcRect l="4307" r="28631" b="707"/>
+          <a:srcRect/>
           <a:stretch/>
         </p:blipFill>
         <p:spPr>
@@ -3717,7 +3719,7 @@
                 <a:ea typeface="+mn-ea"/>
                 <a:cs typeface="+mn-cs"/>
               </a:rPr>
-              <a:t>Montana Brown– Student</a:t>
+              <a:t>Montana Brown – Student</a:t>
             </a:r>
             <a:endParaRPr lang="en-GB" dirty="0"/>
           </a:p>
@@ -3906,14 +3908,14 @@
           <p:nvPr/>
         </p:nvPicPr>
         <p:blipFill rotWithShape="1">
-          <a:blip r:embed="rId2">
+          <a:blip r:embed="rId2" cstate="print">
             <a:extLst>
               <a:ext uri="{28A0092B-C50C-407E-A947-70E740481C1C}">
-                <a14:useLocalDpi xmlns:a14="http://schemas.microsoft.com/office/drawing/2010/main" val="0"/>
+                <a14:useLocalDpi xmlns:a14="http://schemas.microsoft.com/office/drawing/2010/main"/>
               </a:ext>
             </a:extLst>
           </a:blip>
-          <a:srcRect l="9903" r="31255"/>
+          <a:srcRect/>
           <a:stretch/>
         </p:blipFill>
         <p:spPr>
@@ -3930,6 +3932,644 @@
     <p:extLst>
       <p:ext uri="{BB962C8B-B14F-4D97-AF65-F5344CB8AC3E}">
         <p14:creationId xmlns:p14="http://schemas.microsoft.com/office/powerpoint/2010/main" val="720817160"/>
+      </p:ext>
+    </p:extLst>
+  </p:cSld>
+  <p:clrMapOvr>
+    <a:masterClrMapping/>
+  </p:clrMapOvr>
+</p:sld>
+</file>
+
+<file path=ppt/slides/slide3.xml><?xml version="1.0" encoding="utf-8"?>
+<p:sld xmlns:a="http://schemas.openxmlformats.org/drawingml/2006/main" xmlns:r="http://schemas.openxmlformats.org/officeDocument/2006/relationships" xmlns:p="http://schemas.openxmlformats.org/presentationml/2006/main">
+  <p:cSld>
+    <p:spTree>
+      <p:nvGrpSpPr>
+        <p:cNvPr id="1" name=""/>
+        <p:cNvGrpSpPr/>
+        <p:nvPr/>
+      </p:nvGrpSpPr>
+      <p:grpSpPr>
+        <a:xfrm>
+          <a:off x="0" y="0"/>
+          <a:ext cx="0" cy="0"/>
+          <a:chOff x="0" y="0"/>
+          <a:chExt cx="0" cy="0"/>
+        </a:xfrm>
+      </p:grpSpPr>
+      <p:sp>
+        <p:nvSpPr>
+          <p:cNvPr id="2" name="Title 1">
+            <a:extLst>
+              <a:ext uri="{FF2B5EF4-FFF2-40B4-BE49-F238E27FC236}">
+                <a16:creationId xmlns:a16="http://schemas.microsoft.com/office/drawing/2014/main" id="{4FF464B4-FC08-49F8-81F4-DF6FD466A8F5}"/>
+              </a:ext>
+            </a:extLst>
+          </p:cNvPr>
+          <p:cNvSpPr>
+            <a:spLocks noGrp="1"/>
+          </p:cNvSpPr>
+          <p:nvPr>
+            <p:ph type="title"/>
+          </p:nvPr>
+        </p:nvSpPr>
+        <p:spPr/>
+        <p:txBody>
+          <a:bodyPr>
+            <a:normAutofit/>
+          </a:bodyPr>
+          <a:lstStyle/>
+          <a:p>
+            <a:pPr lvl="0">
+              <a:spcBef>
+                <a:spcPts val="1000"/>
+              </a:spcBef>
+            </a:pPr>
+            <a:r>
+              <a:rPr lang="en-GB" dirty="0">
+                <a:solidFill>
+                  <a:schemeClr val="accent1">
+                    <a:lumMod val="75000"/>
+                  </a:schemeClr>
+                </a:solidFill>
+              </a:rPr>
+              <a:t>User Persona 3:</a:t>
+            </a:r>
+            <a:br>
+              <a:rPr lang="en-GB" dirty="0"/>
+            </a:br>
+            <a:r>
+              <a:rPr lang="en-GB" sz="2800" dirty="0">
+                <a:latin typeface="+mn-lt"/>
+              </a:rPr>
+              <a:t>Naomi</a:t>
+            </a:r>
+            <a:r>
+              <a:rPr lang="en-GB" sz="2800" dirty="0">
+                <a:solidFill>
+                  <a:prstClr val="black"/>
+                </a:solidFill>
+                <a:latin typeface="+mn-lt"/>
+                <a:ea typeface="+mn-ea"/>
+                <a:cs typeface="+mn-cs"/>
+              </a:rPr>
+              <a:t> Masu – Student</a:t>
+            </a:r>
+            <a:endParaRPr lang="en-GB" dirty="0">
+              <a:latin typeface="+mn-lt"/>
+            </a:endParaRPr>
+          </a:p>
+        </p:txBody>
+      </p:sp>
+      <p:sp>
+        <p:nvSpPr>
+          <p:cNvPr id="3" name="Content Placeholder 2">
+            <a:extLst>
+              <a:ext uri="{FF2B5EF4-FFF2-40B4-BE49-F238E27FC236}">
+                <a16:creationId xmlns:a16="http://schemas.microsoft.com/office/drawing/2014/main" id="{C46B5B20-B398-4149-889D-A5B4CD6F82E8}"/>
+              </a:ext>
+            </a:extLst>
+          </p:cNvPr>
+          <p:cNvSpPr>
+            <a:spLocks noGrp="1"/>
+          </p:cNvSpPr>
+          <p:nvPr>
+            <p:ph idx="1"/>
+          </p:nvPr>
+        </p:nvSpPr>
+        <p:spPr>
+          <a:xfrm>
+            <a:off x="838201" y="1624614"/>
+            <a:ext cx="5021062" cy="4552349"/>
+          </a:xfrm>
+        </p:spPr>
+        <p:txBody>
+          <a:bodyPr>
+            <a:normAutofit fontScale="92500" lnSpcReduction="20000"/>
+          </a:bodyPr>
+          <a:lstStyle/>
+          <a:p>
+            <a:pPr marL="0" indent="0" algn="just">
+              <a:buNone/>
+            </a:pPr>
+            <a:r>
+              <a:rPr lang="en-GB" sz="2400" dirty="0">
+                <a:solidFill>
+                  <a:schemeClr val="accent1">
+                    <a:lumMod val="75000"/>
+                  </a:schemeClr>
+                </a:solidFill>
+              </a:rPr>
+              <a:t>General Description:</a:t>
+            </a:r>
+          </a:p>
+          <a:p>
+            <a:pPr marL="0" indent="0" algn="just">
+              <a:buNone/>
+            </a:pPr>
+            <a:r>
+              <a:rPr lang="en-GB" sz="2400" dirty="0"/>
+              <a:t>Naomi is a 18 year old student who is studying Statistics at Glasgow University. She originally lived in Japan and has moved to Glasgow for education. She is a very outgoing and family oriented person, who has enjoyed a very socially active lifestyle.</a:t>
+            </a:r>
+          </a:p>
+          <a:p>
+            <a:pPr marL="0" indent="0" algn="just">
+              <a:buNone/>
+            </a:pPr>
+            <a:r>
+              <a:rPr lang="en-GB" sz="2400" dirty="0">
+                <a:solidFill>
+                  <a:schemeClr val="accent1">
+                    <a:lumMod val="75000"/>
+                  </a:schemeClr>
+                </a:solidFill>
+              </a:rPr>
+              <a:t>Frustrations:</a:t>
+            </a:r>
+          </a:p>
+          <a:p>
+            <a:pPr marL="0" indent="0">
+              <a:buNone/>
+            </a:pPr>
+            <a:r>
+              <a:rPr lang="en-GB" sz="2400" dirty="0"/>
+              <a:t>Academically Naomi excels, but she has found moving away from her family and friends to be difficult and is nervous that the difference of culture between her home and the UK will make finding new friends and settling in properly difficult. But she wishes to restore her social lifestyle despite the move.</a:t>
+            </a:r>
+          </a:p>
+        </p:txBody>
+      </p:sp>
+      <p:sp>
+        <p:nvSpPr>
+          <p:cNvPr id="4" name="TextBox 3">
+            <a:extLst>
+              <a:ext uri="{FF2B5EF4-FFF2-40B4-BE49-F238E27FC236}">
+                <a16:creationId xmlns:a16="http://schemas.microsoft.com/office/drawing/2014/main" id="{B4DCE908-D746-4776-BBE6-3464C02178D8}"/>
+              </a:ext>
+            </a:extLst>
+          </p:cNvPr>
+          <p:cNvSpPr txBox="1"/>
+          <p:nvPr/>
+        </p:nvSpPr>
+        <p:spPr>
+          <a:xfrm>
+            <a:off x="6332739" y="3016250"/>
+            <a:ext cx="4935984" cy="2369880"/>
+          </a:xfrm>
+          <a:prstGeom prst="rect">
+            <a:avLst/>
+          </a:prstGeom>
+          <a:noFill/>
+        </p:spPr>
+        <p:txBody>
+          <a:bodyPr wrap="square" rtlCol="0">
+            <a:spAutoFit/>
+          </a:bodyPr>
+          <a:lstStyle/>
+          <a:p>
+            <a:pPr algn="just"/>
+            <a:r>
+              <a:rPr lang="en-GB" sz="2000" dirty="0">
+                <a:solidFill>
+                  <a:schemeClr val="accent1">
+                    <a:lumMod val="75000"/>
+                  </a:schemeClr>
+                </a:solidFill>
+              </a:rPr>
+              <a:t>Goals:</a:t>
+            </a:r>
+          </a:p>
+          <a:p>
+            <a:pPr marL="285750" indent="-285750" algn="just">
+              <a:buFont typeface="Arial" panose="020B0604020202020204" pitchFamily="34" charset="0"/>
+              <a:buChar char="•"/>
+            </a:pPr>
+            <a:r>
+              <a:rPr lang="en-GB" dirty="0"/>
+              <a:t>She wants to achieve good grades</a:t>
+            </a:r>
+          </a:p>
+          <a:p>
+            <a:pPr marL="285750" indent="-285750" algn="just">
+              <a:buFont typeface="Arial" panose="020B0604020202020204" pitchFamily="34" charset="0"/>
+              <a:buChar char="•"/>
+            </a:pPr>
+            <a:r>
+              <a:rPr lang="en-GB" dirty="0"/>
+              <a:t>She wants to make new friends.</a:t>
+            </a:r>
+          </a:p>
+          <a:p>
+            <a:pPr marL="285750" indent="-285750" algn="just">
+              <a:buFont typeface="Arial" panose="020B0604020202020204" pitchFamily="34" charset="0"/>
+              <a:buChar char="•"/>
+            </a:pPr>
+            <a:r>
+              <a:rPr lang="en-GB" dirty="0"/>
+              <a:t>She wants to integrate into her new surroundings.</a:t>
+            </a:r>
+          </a:p>
+          <a:p>
+            <a:pPr algn="just"/>
+            <a:r>
+              <a:rPr lang="en-GB" sz="2000" dirty="0">
+                <a:solidFill>
+                  <a:schemeClr val="accent1">
+                    <a:lumMod val="75000"/>
+                  </a:schemeClr>
+                </a:solidFill>
+              </a:rPr>
+              <a:t>Needs</a:t>
+            </a:r>
+            <a:r>
+              <a:rPr lang="en-GB" sz="1600" dirty="0">
+                <a:solidFill>
+                  <a:schemeClr val="accent1">
+                    <a:lumMod val="75000"/>
+                  </a:schemeClr>
+                </a:solidFill>
+              </a:rPr>
+              <a:t>:</a:t>
+            </a:r>
+          </a:p>
+          <a:p>
+            <a:pPr marL="285750" indent="-285750" algn="just">
+              <a:buFont typeface="Arial" panose="020B0604020202020204" pitchFamily="34" charset="0"/>
+              <a:buChar char="•"/>
+            </a:pPr>
+            <a:r>
+              <a:rPr lang="en-GB" dirty="0"/>
+              <a:t>Naomi needs the ability to connect and meet with new people.</a:t>
+            </a:r>
+          </a:p>
+        </p:txBody>
+      </p:sp>
+      <p:pic>
+        <p:nvPicPr>
+          <p:cNvPr id="17" name="Picture 16">
+            <a:extLst>
+              <a:ext uri="{FF2B5EF4-FFF2-40B4-BE49-F238E27FC236}">
+                <a16:creationId xmlns:a16="http://schemas.microsoft.com/office/drawing/2014/main" id="{A55275F1-40F7-4BDE-B9E8-9A4A0D6584CB}"/>
+              </a:ext>
+            </a:extLst>
+          </p:cNvPr>
+          <p:cNvPicPr>
+            <a:picLocks noChangeAspect="1"/>
+          </p:cNvPicPr>
+          <p:nvPr/>
+        </p:nvPicPr>
+        <p:blipFill rotWithShape="1">
+          <a:blip r:embed="rId2" cstate="print">
+            <a:extLst>
+              <a:ext uri="{28A0092B-C50C-407E-A947-70E740481C1C}">
+                <a14:useLocalDpi xmlns:a14="http://schemas.microsoft.com/office/drawing/2010/main"/>
+              </a:ext>
+            </a:extLst>
+          </a:blip>
+          <a:srcRect/>
+          <a:stretch/>
+        </p:blipFill>
+        <p:spPr>
+          <a:xfrm>
+            <a:off x="7612381" y="530862"/>
+            <a:ext cx="2381126" cy="1976815"/>
+          </a:xfrm>
+          <a:prstGeom prst="rect">
+            <a:avLst/>
+          </a:prstGeom>
+        </p:spPr>
+      </p:pic>
+    </p:spTree>
+    <p:extLst>
+      <p:ext uri="{BB962C8B-B14F-4D97-AF65-F5344CB8AC3E}">
+        <p14:creationId xmlns:p14="http://schemas.microsoft.com/office/powerpoint/2010/main" val="516482717"/>
+      </p:ext>
+    </p:extLst>
+  </p:cSld>
+  <p:clrMapOvr>
+    <a:masterClrMapping/>
+  </p:clrMapOvr>
+</p:sld>
+</file>
+
+<file path=ppt/slides/slide4.xml><?xml version="1.0" encoding="utf-8"?>
+<p:sld xmlns:a="http://schemas.openxmlformats.org/drawingml/2006/main" xmlns:r="http://schemas.openxmlformats.org/officeDocument/2006/relationships" xmlns:p="http://schemas.openxmlformats.org/presentationml/2006/main">
+  <p:cSld>
+    <p:spTree>
+      <p:nvGrpSpPr>
+        <p:cNvPr id="1" name=""/>
+        <p:cNvGrpSpPr/>
+        <p:nvPr/>
+      </p:nvGrpSpPr>
+      <p:grpSpPr>
+        <a:xfrm>
+          <a:off x="0" y="0"/>
+          <a:ext cx="0" cy="0"/>
+          <a:chOff x="0" y="0"/>
+          <a:chExt cx="0" cy="0"/>
+        </a:xfrm>
+      </p:grpSpPr>
+      <p:sp>
+        <p:nvSpPr>
+          <p:cNvPr id="2" name="Title 1">
+            <a:extLst>
+              <a:ext uri="{FF2B5EF4-FFF2-40B4-BE49-F238E27FC236}">
+                <a16:creationId xmlns:a16="http://schemas.microsoft.com/office/drawing/2014/main" id="{4FF464B4-FC08-49F8-81F4-DF6FD466A8F5}"/>
+              </a:ext>
+            </a:extLst>
+          </p:cNvPr>
+          <p:cNvSpPr>
+            <a:spLocks noGrp="1"/>
+          </p:cNvSpPr>
+          <p:nvPr>
+            <p:ph type="title"/>
+          </p:nvPr>
+        </p:nvSpPr>
+        <p:spPr/>
+        <p:txBody>
+          <a:bodyPr>
+            <a:normAutofit/>
+          </a:bodyPr>
+          <a:lstStyle/>
+          <a:p>
+            <a:pPr lvl="0">
+              <a:spcBef>
+                <a:spcPts val="1000"/>
+              </a:spcBef>
+            </a:pPr>
+            <a:r>
+              <a:rPr lang="en-GB" dirty="0">
+                <a:solidFill>
+                  <a:schemeClr val="accent1">
+                    <a:lumMod val="75000"/>
+                  </a:schemeClr>
+                </a:solidFill>
+              </a:rPr>
+              <a:t>User Persona 4:</a:t>
+            </a:r>
+            <a:br>
+              <a:rPr lang="en-GB" dirty="0"/>
+            </a:br>
+            <a:r>
+              <a:rPr lang="en-GB" sz="2800" dirty="0">
+                <a:latin typeface="+mn-lt"/>
+              </a:rPr>
+              <a:t>Doctor </a:t>
+            </a:r>
+            <a:r>
+              <a:rPr lang="en-GB" sz="2800" dirty="0">
+                <a:solidFill>
+                  <a:prstClr val="black"/>
+                </a:solidFill>
+                <a:latin typeface="Calibri" panose="020F0502020204030204"/>
+                <a:ea typeface="+mn-ea"/>
+                <a:cs typeface="+mn-cs"/>
+              </a:rPr>
+              <a:t>David Kanas – Lecturer</a:t>
+            </a:r>
+            <a:endParaRPr lang="en-GB" sz="2800" dirty="0"/>
+          </a:p>
+        </p:txBody>
+      </p:sp>
+      <p:sp>
+        <p:nvSpPr>
+          <p:cNvPr id="3" name="Content Placeholder 2">
+            <a:extLst>
+              <a:ext uri="{FF2B5EF4-FFF2-40B4-BE49-F238E27FC236}">
+                <a16:creationId xmlns:a16="http://schemas.microsoft.com/office/drawing/2014/main" id="{C46B5B20-B398-4149-889D-A5B4CD6F82E8}"/>
+              </a:ext>
+            </a:extLst>
+          </p:cNvPr>
+          <p:cNvSpPr>
+            <a:spLocks noGrp="1"/>
+          </p:cNvSpPr>
+          <p:nvPr>
+            <p:ph idx="1"/>
+          </p:nvPr>
+        </p:nvSpPr>
+        <p:spPr>
+          <a:xfrm>
+            <a:off x="838201" y="1624614"/>
+            <a:ext cx="5021062" cy="4552349"/>
+          </a:xfrm>
+        </p:spPr>
+        <p:txBody>
+          <a:bodyPr>
+            <a:normAutofit fontScale="85000" lnSpcReduction="10000"/>
+          </a:bodyPr>
+          <a:lstStyle/>
+          <a:p>
+            <a:pPr marL="0" indent="0" algn="just">
+              <a:buNone/>
+            </a:pPr>
+            <a:r>
+              <a:rPr lang="en-GB" sz="2400" dirty="0">
+                <a:solidFill>
+                  <a:schemeClr val="accent1">
+                    <a:lumMod val="75000"/>
+                  </a:schemeClr>
+                </a:solidFill>
+              </a:rPr>
+              <a:t>General Description:</a:t>
+            </a:r>
+          </a:p>
+          <a:p>
+            <a:pPr marL="0" indent="0" algn="just">
+              <a:buNone/>
+            </a:pPr>
+            <a:r>
+              <a:rPr lang="en-GB" sz="2000" dirty="0"/>
+              <a:t>David is a 45 year </a:t>
+            </a:r>
+            <a:r>
+              <a:rPr lang="en-GB" sz="2000"/>
+              <a:t>old Mathematics </a:t>
+            </a:r>
+            <a:r>
+              <a:rPr lang="en-GB" sz="2000" dirty="0"/>
+              <a:t>lecturer, who has been working at Glasgow University for 8 years. He lives in the outskirts of Glasgow and drives into work each day, and spends the weekends at home with his family. He is also rather old school, and prefers to use pen and paper over technology as much as possible, and as such he has only limited IT experience.</a:t>
+            </a:r>
+          </a:p>
+          <a:p>
+            <a:pPr marL="0" indent="0" algn="just">
+              <a:buNone/>
+            </a:pPr>
+            <a:r>
+              <a:rPr lang="en-GB" sz="2400" dirty="0">
+                <a:solidFill>
+                  <a:schemeClr val="accent1">
+                    <a:lumMod val="75000"/>
+                  </a:schemeClr>
+                </a:solidFill>
+              </a:rPr>
+              <a:t>Frustrations:</a:t>
+            </a:r>
+          </a:p>
+          <a:p>
+            <a:pPr marL="0" indent="0" algn="just">
+              <a:buNone/>
+            </a:pPr>
+            <a:r>
+              <a:rPr lang="en-GB" sz="2000" dirty="0"/>
+              <a:t>Among all his work commitments, David does not find enough time during the week to answer all of the questions students have during his limited office hours, and lecture times. He wishes there was a more convenient way than emails to assist his students outside class times, especially weekends. </a:t>
+            </a:r>
+          </a:p>
+          <a:p>
+            <a:pPr marL="0" indent="0" algn="just">
+              <a:buNone/>
+            </a:pPr>
+            <a:r>
+              <a:rPr lang="en-GB" sz="2000" dirty="0"/>
+              <a:t>Despite his limited understanding of technology, he is willing to try to use an online system to solve his problem, but fears it will be too complex for him.</a:t>
+            </a:r>
+          </a:p>
+        </p:txBody>
+      </p:sp>
+      <p:sp>
+        <p:nvSpPr>
+          <p:cNvPr id="4" name="TextBox 3">
+            <a:extLst>
+              <a:ext uri="{FF2B5EF4-FFF2-40B4-BE49-F238E27FC236}">
+                <a16:creationId xmlns:a16="http://schemas.microsoft.com/office/drawing/2014/main" id="{B4DCE908-D746-4776-BBE6-3464C02178D8}"/>
+              </a:ext>
+            </a:extLst>
+          </p:cNvPr>
+          <p:cNvSpPr txBox="1"/>
+          <p:nvPr/>
+        </p:nvSpPr>
+        <p:spPr>
+          <a:xfrm>
+            <a:off x="6332739" y="3016250"/>
+            <a:ext cx="4935984" cy="2923877"/>
+          </a:xfrm>
+          <a:prstGeom prst="rect">
+            <a:avLst/>
+          </a:prstGeom>
+          <a:noFill/>
+        </p:spPr>
+        <p:txBody>
+          <a:bodyPr wrap="square" rtlCol="0">
+            <a:spAutoFit/>
+          </a:bodyPr>
+          <a:lstStyle/>
+          <a:p>
+            <a:pPr algn="just"/>
+            <a:r>
+              <a:rPr lang="en-GB" sz="2000" dirty="0">
+                <a:solidFill>
+                  <a:schemeClr val="accent1">
+                    <a:lumMod val="75000"/>
+                  </a:schemeClr>
+                </a:solidFill>
+              </a:rPr>
+              <a:t>Goals:</a:t>
+            </a:r>
+          </a:p>
+          <a:p>
+            <a:pPr marL="285750" indent="-285750" algn="just">
+              <a:buFont typeface="Arial" panose="020B0604020202020204" pitchFamily="34" charset="0"/>
+              <a:buChar char="•"/>
+            </a:pPr>
+            <a:r>
+              <a:rPr lang="en-GB" dirty="0"/>
+              <a:t>To help his students understand course content.</a:t>
+            </a:r>
+          </a:p>
+          <a:p>
+            <a:pPr marL="285750" indent="-285750" algn="just">
+              <a:buFont typeface="Arial" panose="020B0604020202020204" pitchFamily="34" charset="0"/>
+              <a:buChar char="•"/>
+            </a:pPr>
+            <a:r>
+              <a:rPr lang="en-GB" dirty="0"/>
+              <a:t>To ensure students understand what is expected of them during the course.</a:t>
+            </a:r>
+          </a:p>
+          <a:p>
+            <a:pPr algn="just"/>
+            <a:r>
+              <a:rPr lang="en-GB" sz="2000" dirty="0">
+                <a:solidFill>
+                  <a:schemeClr val="accent1">
+                    <a:lumMod val="75000"/>
+                  </a:schemeClr>
+                </a:solidFill>
+              </a:rPr>
+              <a:t>Needs</a:t>
+            </a:r>
+            <a:r>
+              <a:rPr lang="en-GB" sz="1600" dirty="0">
+                <a:solidFill>
+                  <a:schemeClr val="accent1">
+                    <a:lumMod val="75000"/>
+                  </a:schemeClr>
+                </a:solidFill>
+              </a:rPr>
+              <a:t>:</a:t>
+            </a:r>
+          </a:p>
+          <a:p>
+            <a:pPr marL="285750" indent="-285750" algn="just">
+              <a:buFont typeface="Arial" panose="020B0604020202020204" pitchFamily="34" charset="0"/>
+              <a:buChar char="•"/>
+            </a:pPr>
+            <a:r>
+              <a:rPr lang="en-GB" dirty="0"/>
+              <a:t>David needs to be able to find and answer questions from his students as quickly and easily as possible.</a:t>
+            </a:r>
+          </a:p>
+          <a:p>
+            <a:pPr marL="285750" indent="-285750" algn="just">
+              <a:buFont typeface="Arial" panose="020B0604020202020204" pitchFamily="34" charset="0"/>
+              <a:buChar char="•"/>
+            </a:pPr>
+            <a:r>
+              <a:rPr lang="en-GB" dirty="0"/>
+              <a:t>He also needs a system that is easy to understand and use.</a:t>
+            </a:r>
+          </a:p>
+        </p:txBody>
+      </p:sp>
+      <p:pic>
+        <p:nvPicPr>
+          <p:cNvPr id="17" name="Picture 16">
+            <a:extLst>
+              <a:ext uri="{FF2B5EF4-FFF2-40B4-BE49-F238E27FC236}">
+                <a16:creationId xmlns:a16="http://schemas.microsoft.com/office/drawing/2014/main" id="{A55275F1-40F7-4BDE-B9E8-9A4A0D6584CB}"/>
+              </a:ext>
+            </a:extLst>
+          </p:cNvPr>
+          <p:cNvPicPr>
+            <a:picLocks noChangeAspect="1"/>
+          </p:cNvPicPr>
+          <p:nvPr/>
+        </p:nvPicPr>
+        <p:blipFill>
+          <a:blip r:embed="rId2" cstate="print">
+            <a:extLst>
+              <a:ext uri="{28A0092B-C50C-407E-A947-70E740481C1C}">
+                <a14:useLocalDpi xmlns:a14="http://schemas.microsoft.com/office/drawing/2010/main"/>
+              </a:ext>
+            </a:extLst>
+          </a:blip>
+          <a:stretch>
+            <a:fillRect/>
+          </a:stretch>
+        </p:blipFill>
+        <p:spPr>
+          <a:xfrm>
+            <a:off x="7303401" y="469093"/>
+            <a:ext cx="3398029" cy="2183941"/>
+          </a:xfrm>
+          <a:prstGeom prst="rect">
+            <a:avLst/>
+          </a:prstGeom>
+        </p:spPr>
+      </p:pic>
+    </p:spTree>
+    <p:extLst>
+      <p:ext uri="{BB962C8B-B14F-4D97-AF65-F5344CB8AC3E}">
+        <p14:creationId xmlns:p14="http://schemas.microsoft.com/office/powerpoint/2010/main" val="2824583214"/>
       </p:ext>
     </p:extLst>
   </p:cSld>

</xml_diff>